<commit_message>
new figures for SI
</commit_message>
<xml_diff>
--- a/plots/supplementary_material/threshold_combined.pptx
+++ b/plots/supplementary_material/threshold_combined.pptx
@@ -243,7 +243,7 @@
           <a:p>
             <a:fld id="{A8964ADD-0953-8940-9E96-FB0BF4E5F7EB}" type="datetimeFigureOut">
               <a:rPr lang="en-GB" smtClean="0"/>
-              <a:t>16/05/2022</a:t>
+              <a:t>30/11/2022</a:t>
             </a:fld>
             <a:endParaRPr lang="en-GB"/>
           </a:p>
@@ -413,7 +413,7 @@
           <a:p>
             <a:fld id="{A8964ADD-0953-8940-9E96-FB0BF4E5F7EB}" type="datetimeFigureOut">
               <a:rPr lang="en-GB" smtClean="0"/>
-              <a:t>16/05/2022</a:t>
+              <a:t>30/11/2022</a:t>
             </a:fld>
             <a:endParaRPr lang="en-GB"/>
           </a:p>
@@ -593,7 +593,7 @@
           <a:p>
             <a:fld id="{A8964ADD-0953-8940-9E96-FB0BF4E5F7EB}" type="datetimeFigureOut">
               <a:rPr lang="en-GB" smtClean="0"/>
-              <a:t>16/05/2022</a:t>
+              <a:t>30/11/2022</a:t>
             </a:fld>
             <a:endParaRPr lang="en-GB"/>
           </a:p>
@@ -763,7 +763,7 @@
           <a:p>
             <a:fld id="{A8964ADD-0953-8940-9E96-FB0BF4E5F7EB}" type="datetimeFigureOut">
               <a:rPr lang="en-GB" smtClean="0"/>
-              <a:t>16/05/2022</a:t>
+              <a:t>30/11/2022</a:t>
             </a:fld>
             <a:endParaRPr lang="en-GB"/>
           </a:p>
@@ -1009,7 +1009,7 @@
           <a:p>
             <a:fld id="{A8964ADD-0953-8940-9E96-FB0BF4E5F7EB}" type="datetimeFigureOut">
               <a:rPr lang="en-GB" smtClean="0"/>
-              <a:t>16/05/2022</a:t>
+              <a:t>30/11/2022</a:t>
             </a:fld>
             <a:endParaRPr lang="en-GB"/>
           </a:p>
@@ -1241,7 +1241,7 @@
           <a:p>
             <a:fld id="{A8964ADD-0953-8940-9E96-FB0BF4E5F7EB}" type="datetimeFigureOut">
               <a:rPr lang="en-GB" smtClean="0"/>
-              <a:t>16/05/2022</a:t>
+              <a:t>30/11/2022</a:t>
             </a:fld>
             <a:endParaRPr lang="en-GB"/>
           </a:p>
@@ -1608,7 +1608,7 @@
           <a:p>
             <a:fld id="{A8964ADD-0953-8940-9E96-FB0BF4E5F7EB}" type="datetimeFigureOut">
               <a:rPr lang="en-GB" smtClean="0"/>
-              <a:t>16/05/2022</a:t>
+              <a:t>30/11/2022</a:t>
             </a:fld>
             <a:endParaRPr lang="en-GB"/>
           </a:p>
@@ -1726,7 +1726,7 @@
           <a:p>
             <a:fld id="{A8964ADD-0953-8940-9E96-FB0BF4E5F7EB}" type="datetimeFigureOut">
               <a:rPr lang="en-GB" smtClean="0"/>
-              <a:t>16/05/2022</a:t>
+              <a:t>30/11/2022</a:t>
             </a:fld>
             <a:endParaRPr lang="en-GB"/>
           </a:p>
@@ -1821,7 +1821,7 @@
           <a:p>
             <a:fld id="{A8964ADD-0953-8940-9E96-FB0BF4E5F7EB}" type="datetimeFigureOut">
               <a:rPr lang="en-GB" smtClean="0"/>
-              <a:t>16/05/2022</a:t>
+              <a:t>30/11/2022</a:t>
             </a:fld>
             <a:endParaRPr lang="en-GB"/>
           </a:p>
@@ -2098,7 +2098,7 @@
           <a:p>
             <a:fld id="{A8964ADD-0953-8940-9E96-FB0BF4E5F7EB}" type="datetimeFigureOut">
               <a:rPr lang="en-GB" smtClean="0"/>
-              <a:t>16/05/2022</a:t>
+              <a:t>30/11/2022</a:t>
             </a:fld>
             <a:endParaRPr lang="en-GB"/>
           </a:p>
@@ -2355,7 +2355,7 @@
           <a:p>
             <a:fld id="{A8964ADD-0953-8940-9E96-FB0BF4E5F7EB}" type="datetimeFigureOut">
               <a:rPr lang="en-GB" smtClean="0"/>
-              <a:t>16/05/2022</a:t>
+              <a:t>30/11/2022</a:t>
             </a:fld>
             <a:endParaRPr lang="en-GB"/>
           </a:p>
@@ -2568,7 +2568,7 @@
           <a:p>
             <a:fld id="{A8964ADD-0953-8940-9E96-FB0BF4E5F7EB}" type="datetimeFigureOut">
               <a:rPr lang="en-GB" smtClean="0"/>
-              <a:t>16/05/2022</a:t>
+              <a:t>30/11/2022</a:t>
             </a:fld>
             <a:endParaRPr lang="en-GB"/>
           </a:p>
@@ -3273,36 +3273,6 @@
           </a:prstGeom>
         </p:spPr>
       </p:pic>
-      <p:pic>
-        <p:nvPicPr>
-          <p:cNvPr id="25" name="Picture 24">
-            <a:extLst>
-              <a:ext uri="{FF2B5EF4-FFF2-40B4-BE49-F238E27FC236}">
-                <a16:creationId xmlns:a16="http://schemas.microsoft.com/office/drawing/2014/main" id="{E626DB73-FFA2-459F-430D-38242D2B965D}"/>
-              </a:ext>
-            </a:extLst>
-          </p:cNvPr>
-          <p:cNvPicPr>
-            <a:picLocks noChangeAspect="1"/>
-          </p:cNvPicPr>
-          <p:nvPr/>
-        </p:nvPicPr>
-        <p:blipFill>
-          <a:blip r:embed="rId6"/>
-          <a:stretch>
-            <a:fillRect/>
-          </a:stretch>
-        </p:blipFill>
-        <p:spPr>
-          <a:xfrm>
-            <a:off x="7034273" y="1883240"/>
-            <a:ext cx="114158" cy="104902"/>
-          </a:xfrm>
-          <a:prstGeom prst="rect">
-            <a:avLst/>
-          </a:prstGeom>
-        </p:spPr>
-      </p:pic>
       <p:sp>
         <p:nvSpPr>
           <p:cNvPr id="33" name="TextBox 32">

</xml_diff>